<commit_message>
updates added before demo presentation
</commit_message>
<xml_diff>
--- a/presentation.pptx
+++ b/presentation.pptx
@@ -586,7 +586,7 @@
           <a:p>
             <a:fld id="{99587299-0E86-4D7C-834B-B5F97371AE13}" type="datetimeFigureOut">
               <a:rPr lang="en-US" smtClean="0"/>
-              <a:t>7/22/2020</a:t>
+              <a:t>7/23/2020</a:t>
             </a:fld>
             <a:endParaRPr lang="en-US"/>
           </a:p>
@@ -1043,7 +1043,7 @@
           <p:cNvPr id="2" name="Title 1">
             <a:extLst>
               <a:ext uri="{FF2B5EF4-FFF2-40B4-BE49-F238E27FC236}">
-                <a16:creationId xmlns="" xmlns:a16="http://schemas.microsoft.com/office/drawing/2014/main" id="{74CB3B42-34FE-4F89-AF42-20D84E8F645D}"/>
+                <a16:creationId xmlns:a16="http://schemas.microsoft.com/office/drawing/2014/main" xmlns="" id="{74CB3B42-34FE-4F89-AF42-20D84E8F645D}"/>
               </a:ext>
             </a:extLst>
           </p:cNvPr>
@@ -1080,7 +1080,7 @@
           <p:cNvPr id="3" name="Subtitle 2">
             <a:extLst>
               <a:ext uri="{FF2B5EF4-FFF2-40B4-BE49-F238E27FC236}">
-                <a16:creationId xmlns="" xmlns:a16="http://schemas.microsoft.com/office/drawing/2014/main" id="{BAAEADC8-C044-475D-964E-3518AF29F740}"/>
+                <a16:creationId xmlns:a16="http://schemas.microsoft.com/office/drawing/2014/main" xmlns="" id="{BAAEADC8-C044-475D-964E-3518AF29F740}"/>
               </a:ext>
             </a:extLst>
           </p:cNvPr>
@@ -1150,7 +1150,7 @@
           <p:cNvPr id="4" name="Date Placeholder 3">
             <a:extLst>
               <a:ext uri="{FF2B5EF4-FFF2-40B4-BE49-F238E27FC236}">
-                <a16:creationId xmlns="" xmlns:a16="http://schemas.microsoft.com/office/drawing/2014/main" id="{8CA9461F-540C-4F0D-8A2F-79046F34CE20}"/>
+                <a16:creationId xmlns:a16="http://schemas.microsoft.com/office/drawing/2014/main" xmlns="" id="{8CA9461F-540C-4F0D-8A2F-79046F34CE20}"/>
               </a:ext>
             </a:extLst>
           </p:cNvPr>
@@ -1168,7 +1168,7 @@
           <a:p>
             <a:fld id="{DEB1FEE5-0530-414D-96B9-88113598593B}" type="datetimeFigureOut">
               <a:rPr lang="en-US" smtClean="0"/>
-              <a:t>7/22/2020</a:t>
+              <a:t>7/23/2020</a:t>
             </a:fld>
             <a:endParaRPr lang="en-US"/>
           </a:p>
@@ -1179,7 +1179,7 @@
           <p:cNvPr id="5" name="Footer Placeholder 4">
             <a:extLst>
               <a:ext uri="{FF2B5EF4-FFF2-40B4-BE49-F238E27FC236}">
-                <a16:creationId xmlns="" xmlns:a16="http://schemas.microsoft.com/office/drawing/2014/main" id="{BCB5ACD2-9CC9-4425-A5CB-5419C890EAA2}"/>
+                <a16:creationId xmlns:a16="http://schemas.microsoft.com/office/drawing/2014/main" xmlns="" id="{BCB5ACD2-9CC9-4425-A5CB-5419C890EAA2}"/>
               </a:ext>
             </a:extLst>
           </p:cNvPr>
@@ -1204,7 +1204,7 @@
           <p:cNvPr id="6" name="Slide Number Placeholder 5">
             <a:extLst>
               <a:ext uri="{FF2B5EF4-FFF2-40B4-BE49-F238E27FC236}">
-                <a16:creationId xmlns="" xmlns:a16="http://schemas.microsoft.com/office/drawing/2014/main" id="{0F78A4CF-2079-499D-8C5A-763CAE67D1A6}"/>
+                <a16:creationId xmlns:a16="http://schemas.microsoft.com/office/drawing/2014/main" xmlns="" id="{0F78A4CF-2079-499D-8C5A-763CAE67D1A6}"/>
               </a:ext>
             </a:extLst>
           </p:cNvPr>
@@ -1263,7 +1263,7 @@
           <p:cNvPr id="2" name="Title 1">
             <a:extLst>
               <a:ext uri="{FF2B5EF4-FFF2-40B4-BE49-F238E27FC236}">
-                <a16:creationId xmlns="" xmlns:a16="http://schemas.microsoft.com/office/drawing/2014/main" id="{94D83A22-0EB9-4B3F-B578-25F5853E64A8}"/>
+                <a16:creationId xmlns:a16="http://schemas.microsoft.com/office/drawing/2014/main" xmlns="" id="{94D83A22-0EB9-4B3F-B578-25F5853E64A8}"/>
               </a:ext>
             </a:extLst>
           </p:cNvPr>
@@ -1291,7 +1291,7 @@
           <p:cNvPr id="3" name="Vertical Text Placeholder 2">
             <a:extLst>
               <a:ext uri="{FF2B5EF4-FFF2-40B4-BE49-F238E27FC236}">
-                <a16:creationId xmlns="" xmlns:a16="http://schemas.microsoft.com/office/drawing/2014/main" id="{222F2EB6-7C39-46D6-A9BB-4FE726D0E0EE}"/>
+                <a16:creationId xmlns:a16="http://schemas.microsoft.com/office/drawing/2014/main" xmlns="" id="{222F2EB6-7C39-46D6-A9BB-4FE726D0E0EE}"/>
               </a:ext>
             </a:extLst>
           </p:cNvPr>
@@ -1348,7 +1348,7 @@
           <p:cNvPr id="4" name="Date Placeholder 3">
             <a:extLst>
               <a:ext uri="{FF2B5EF4-FFF2-40B4-BE49-F238E27FC236}">
-                <a16:creationId xmlns="" xmlns:a16="http://schemas.microsoft.com/office/drawing/2014/main" id="{35361AC5-9CC3-4ACD-B628-0CB5377B7DB3}"/>
+                <a16:creationId xmlns:a16="http://schemas.microsoft.com/office/drawing/2014/main" xmlns="" id="{35361AC5-9CC3-4ACD-B628-0CB5377B7DB3}"/>
               </a:ext>
             </a:extLst>
           </p:cNvPr>
@@ -1366,7 +1366,7 @@
           <a:p>
             <a:fld id="{DEB1FEE5-0530-414D-96B9-88113598593B}" type="datetimeFigureOut">
               <a:rPr lang="en-US" smtClean="0"/>
-              <a:t>7/22/2020</a:t>
+              <a:t>7/23/2020</a:t>
             </a:fld>
             <a:endParaRPr lang="en-US"/>
           </a:p>
@@ -1377,7 +1377,7 @@
           <p:cNvPr id="5" name="Footer Placeholder 4">
             <a:extLst>
               <a:ext uri="{FF2B5EF4-FFF2-40B4-BE49-F238E27FC236}">
-                <a16:creationId xmlns="" xmlns:a16="http://schemas.microsoft.com/office/drawing/2014/main" id="{18105882-F008-4ABB-B2CC-F6A24DA7A283}"/>
+                <a16:creationId xmlns:a16="http://schemas.microsoft.com/office/drawing/2014/main" xmlns="" id="{18105882-F008-4ABB-B2CC-F6A24DA7A283}"/>
               </a:ext>
             </a:extLst>
           </p:cNvPr>
@@ -1402,7 +1402,7 @@
           <p:cNvPr id="6" name="Slide Number Placeholder 5">
             <a:extLst>
               <a:ext uri="{FF2B5EF4-FFF2-40B4-BE49-F238E27FC236}">
-                <a16:creationId xmlns="" xmlns:a16="http://schemas.microsoft.com/office/drawing/2014/main" id="{87C90FF4-37A4-4B07-9C64-13CBD7BA4BBE}"/>
+                <a16:creationId xmlns:a16="http://schemas.microsoft.com/office/drawing/2014/main" xmlns="" id="{87C90FF4-37A4-4B07-9C64-13CBD7BA4BBE}"/>
               </a:ext>
             </a:extLst>
           </p:cNvPr>
@@ -1461,7 +1461,7 @@
           <p:cNvPr id="2" name="Vertical Title 1">
             <a:extLst>
               <a:ext uri="{FF2B5EF4-FFF2-40B4-BE49-F238E27FC236}">
-                <a16:creationId xmlns="" xmlns:a16="http://schemas.microsoft.com/office/drawing/2014/main" id="{D4CFFC75-FB04-4070-ACF3-17B74E1E49A0}"/>
+                <a16:creationId xmlns:a16="http://schemas.microsoft.com/office/drawing/2014/main" xmlns="" id="{D4CFFC75-FB04-4070-ACF3-17B74E1E49A0}"/>
               </a:ext>
             </a:extLst>
           </p:cNvPr>
@@ -1494,7 +1494,7 @@
           <p:cNvPr id="3" name="Vertical Text Placeholder 2">
             <a:extLst>
               <a:ext uri="{FF2B5EF4-FFF2-40B4-BE49-F238E27FC236}">
-                <a16:creationId xmlns="" xmlns:a16="http://schemas.microsoft.com/office/drawing/2014/main" id="{E8DC022A-F28A-42FE-B136-97D2DB44E1CD}"/>
+                <a16:creationId xmlns:a16="http://schemas.microsoft.com/office/drawing/2014/main" xmlns="" id="{E8DC022A-F28A-42FE-B136-97D2DB44E1CD}"/>
               </a:ext>
             </a:extLst>
           </p:cNvPr>
@@ -1556,7 +1556,7 @@
           <p:cNvPr id="4" name="Date Placeholder 3">
             <a:extLst>
               <a:ext uri="{FF2B5EF4-FFF2-40B4-BE49-F238E27FC236}">
-                <a16:creationId xmlns="" xmlns:a16="http://schemas.microsoft.com/office/drawing/2014/main" id="{E5436E70-3209-4B1D-8141-7D7A8CB50EB0}"/>
+                <a16:creationId xmlns:a16="http://schemas.microsoft.com/office/drawing/2014/main" xmlns="" id="{E5436E70-3209-4B1D-8141-7D7A8CB50EB0}"/>
               </a:ext>
             </a:extLst>
           </p:cNvPr>
@@ -1574,7 +1574,7 @@
           <a:p>
             <a:fld id="{DEB1FEE5-0530-414D-96B9-88113598593B}" type="datetimeFigureOut">
               <a:rPr lang="en-US" smtClean="0"/>
-              <a:t>7/22/2020</a:t>
+              <a:t>7/23/2020</a:t>
             </a:fld>
             <a:endParaRPr lang="en-US"/>
           </a:p>
@@ -1585,7 +1585,7 @@
           <p:cNvPr id="5" name="Footer Placeholder 4">
             <a:extLst>
               <a:ext uri="{FF2B5EF4-FFF2-40B4-BE49-F238E27FC236}">
-                <a16:creationId xmlns="" xmlns:a16="http://schemas.microsoft.com/office/drawing/2014/main" id="{0CCEEE92-3BC7-4251-9BA8-4DB85DFDCE30}"/>
+                <a16:creationId xmlns:a16="http://schemas.microsoft.com/office/drawing/2014/main" xmlns="" id="{0CCEEE92-3BC7-4251-9BA8-4DB85DFDCE30}"/>
               </a:ext>
             </a:extLst>
           </p:cNvPr>
@@ -1610,7 +1610,7 @@
           <p:cNvPr id="6" name="Slide Number Placeholder 5">
             <a:extLst>
               <a:ext uri="{FF2B5EF4-FFF2-40B4-BE49-F238E27FC236}">
-                <a16:creationId xmlns="" xmlns:a16="http://schemas.microsoft.com/office/drawing/2014/main" id="{20BFE1BB-FF5B-4BC1-8FB0-68000A99BC49}"/>
+                <a16:creationId xmlns:a16="http://schemas.microsoft.com/office/drawing/2014/main" xmlns="" id="{20BFE1BB-FF5B-4BC1-8FB0-68000A99BC49}"/>
               </a:ext>
             </a:extLst>
           </p:cNvPr>
@@ -1669,7 +1669,7 @@
           <p:cNvPr id="2" name="Title 1">
             <a:extLst>
               <a:ext uri="{FF2B5EF4-FFF2-40B4-BE49-F238E27FC236}">
-                <a16:creationId xmlns="" xmlns:a16="http://schemas.microsoft.com/office/drawing/2014/main" id="{EFE1E8BF-1E87-4CD1-AF63-7672EB209355}"/>
+                <a16:creationId xmlns:a16="http://schemas.microsoft.com/office/drawing/2014/main" xmlns="" id="{EFE1E8BF-1E87-4CD1-AF63-7672EB209355}"/>
               </a:ext>
             </a:extLst>
           </p:cNvPr>
@@ -1697,7 +1697,7 @@
           <p:cNvPr id="3" name="Content Placeholder 2">
             <a:extLst>
               <a:ext uri="{FF2B5EF4-FFF2-40B4-BE49-F238E27FC236}">
-                <a16:creationId xmlns="" xmlns:a16="http://schemas.microsoft.com/office/drawing/2014/main" id="{19C10D01-C8D3-4852-95DB-8784F9DA536F}"/>
+                <a16:creationId xmlns:a16="http://schemas.microsoft.com/office/drawing/2014/main" xmlns="" id="{19C10D01-C8D3-4852-95DB-8784F9DA536F}"/>
               </a:ext>
             </a:extLst>
           </p:cNvPr>
@@ -1754,7 +1754,7 @@
           <p:cNvPr id="4" name="Date Placeholder 3">
             <a:extLst>
               <a:ext uri="{FF2B5EF4-FFF2-40B4-BE49-F238E27FC236}">
-                <a16:creationId xmlns="" xmlns:a16="http://schemas.microsoft.com/office/drawing/2014/main" id="{E32E90B2-5259-47FC-B041-7AD0037CD92E}"/>
+                <a16:creationId xmlns:a16="http://schemas.microsoft.com/office/drawing/2014/main" xmlns="" id="{E32E90B2-5259-47FC-B041-7AD0037CD92E}"/>
               </a:ext>
             </a:extLst>
           </p:cNvPr>
@@ -1772,7 +1772,7 @@
           <a:p>
             <a:fld id="{DEB1FEE5-0530-414D-96B9-88113598593B}" type="datetimeFigureOut">
               <a:rPr lang="en-US" smtClean="0"/>
-              <a:t>7/22/2020</a:t>
+              <a:t>7/23/2020</a:t>
             </a:fld>
             <a:endParaRPr lang="en-US"/>
           </a:p>
@@ -1783,7 +1783,7 @@
           <p:cNvPr id="5" name="Footer Placeholder 4">
             <a:extLst>
               <a:ext uri="{FF2B5EF4-FFF2-40B4-BE49-F238E27FC236}">
-                <a16:creationId xmlns="" xmlns:a16="http://schemas.microsoft.com/office/drawing/2014/main" id="{D9986EA6-9A4D-453A-A7E1-15CED315CCAD}"/>
+                <a16:creationId xmlns:a16="http://schemas.microsoft.com/office/drawing/2014/main" xmlns="" id="{D9986EA6-9A4D-453A-A7E1-15CED315CCAD}"/>
               </a:ext>
             </a:extLst>
           </p:cNvPr>
@@ -1808,7 +1808,7 @@
           <p:cNvPr id="6" name="Slide Number Placeholder 5">
             <a:extLst>
               <a:ext uri="{FF2B5EF4-FFF2-40B4-BE49-F238E27FC236}">
-                <a16:creationId xmlns="" xmlns:a16="http://schemas.microsoft.com/office/drawing/2014/main" id="{E97CAF34-35AB-4550-8C0C-9B86C12F644B}"/>
+                <a16:creationId xmlns:a16="http://schemas.microsoft.com/office/drawing/2014/main" xmlns="" id="{E97CAF34-35AB-4550-8C0C-9B86C12F644B}"/>
               </a:ext>
             </a:extLst>
           </p:cNvPr>
@@ -1867,7 +1867,7 @@
           <p:cNvPr id="2" name="Title 1">
             <a:extLst>
               <a:ext uri="{FF2B5EF4-FFF2-40B4-BE49-F238E27FC236}">
-                <a16:creationId xmlns="" xmlns:a16="http://schemas.microsoft.com/office/drawing/2014/main" id="{BB916C6A-A086-417B-9D9B-D1DE4E55ED82}"/>
+                <a16:creationId xmlns:a16="http://schemas.microsoft.com/office/drawing/2014/main" xmlns="" id="{BB916C6A-A086-417B-9D9B-D1DE4E55ED82}"/>
               </a:ext>
             </a:extLst>
           </p:cNvPr>
@@ -1904,7 +1904,7 @@
           <p:cNvPr id="3" name="Text Placeholder 2">
             <a:extLst>
               <a:ext uri="{FF2B5EF4-FFF2-40B4-BE49-F238E27FC236}">
-                <a16:creationId xmlns="" xmlns:a16="http://schemas.microsoft.com/office/drawing/2014/main" id="{70C29A8C-B4CF-469F-A48A-C287A37DF087}"/>
+                <a16:creationId xmlns:a16="http://schemas.microsoft.com/office/drawing/2014/main" xmlns="" id="{70C29A8C-B4CF-469F-A48A-C287A37DF087}"/>
               </a:ext>
             </a:extLst>
           </p:cNvPr>
@@ -2029,7 +2029,7 @@
           <p:cNvPr id="4" name="Date Placeholder 3">
             <a:extLst>
               <a:ext uri="{FF2B5EF4-FFF2-40B4-BE49-F238E27FC236}">
-                <a16:creationId xmlns="" xmlns:a16="http://schemas.microsoft.com/office/drawing/2014/main" id="{5179447B-29EC-4F00-9705-09AB61AEF67D}"/>
+                <a16:creationId xmlns:a16="http://schemas.microsoft.com/office/drawing/2014/main" xmlns="" id="{5179447B-29EC-4F00-9705-09AB61AEF67D}"/>
               </a:ext>
             </a:extLst>
           </p:cNvPr>
@@ -2047,7 +2047,7 @@
           <a:p>
             <a:fld id="{DEB1FEE5-0530-414D-96B9-88113598593B}" type="datetimeFigureOut">
               <a:rPr lang="en-US" smtClean="0"/>
-              <a:t>7/22/2020</a:t>
+              <a:t>7/23/2020</a:t>
             </a:fld>
             <a:endParaRPr lang="en-US"/>
           </a:p>
@@ -2058,7 +2058,7 @@
           <p:cNvPr id="5" name="Footer Placeholder 4">
             <a:extLst>
               <a:ext uri="{FF2B5EF4-FFF2-40B4-BE49-F238E27FC236}">
-                <a16:creationId xmlns="" xmlns:a16="http://schemas.microsoft.com/office/drawing/2014/main" id="{FD5E7B0A-AE37-4B5B-9E1F-8DD5ED94C003}"/>
+                <a16:creationId xmlns:a16="http://schemas.microsoft.com/office/drawing/2014/main" xmlns="" id="{FD5E7B0A-AE37-4B5B-9E1F-8DD5ED94C003}"/>
               </a:ext>
             </a:extLst>
           </p:cNvPr>
@@ -2083,7 +2083,7 @@
           <p:cNvPr id="6" name="Slide Number Placeholder 5">
             <a:extLst>
               <a:ext uri="{FF2B5EF4-FFF2-40B4-BE49-F238E27FC236}">
-                <a16:creationId xmlns="" xmlns:a16="http://schemas.microsoft.com/office/drawing/2014/main" id="{712A98C8-FA62-477F-AA35-E74917AD28FE}"/>
+                <a16:creationId xmlns:a16="http://schemas.microsoft.com/office/drawing/2014/main" xmlns="" id="{712A98C8-FA62-477F-AA35-E74917AD28FE}"/>
               </a:ext>
             </a:extLst>
           </p:cNvPr>
@@ -2142,7 +2142,7 @@
           <p:cNvPr id="2" name="Title 1">
             <a:extLst>
               <a:ext uri="{FF2B5EF4-FFF2-40B4-BE49-F238E27FC236}">
-                <a16:creationId xmlns="" xmlns:a16="http://schemas.microsoft.com/office/drawing/2014/main" id="{B744062A-C751-4B41-B996-7641A7BF9A1A}"/>
+                <a16:creationId xmlns:a16="http://schemas.microsoft.com/office/drawing/2014/main" xmlns="" id="{B744062A-C751-4B41-B996-7641A7BF9A1A}"/>
               </a:ext>
             </a:extLst>
           </p:cNvPr>
@@ -2170,7 +2170,7 @@
           <p:cNvPr id="3" name="Content Placeholder 2">
             <a:extLst>
               <a:ext uri="{FF2B5EF4-FFF2-40B4-BE49-F238E27FC236}">
-                <a16:creationId xmlns="" xmlns:a16="http://schemas.microsoft.com/office/drawing/2014/main" id="{324A939A-0038-464A-881F-3122AA68A0C1}"/>
+                <a16:creationId xmlns:a16="http://schemas.microsoft.com/office/drawing/2014/main" xmlns="" id="{324A939A-0038-464A-881F-3122AA68A0C1}"/>
               </a:ext>
             </a:extLst>
           </p:cNvPr>
@@ -2232,7 +2232,7 @@
           <p:cNvPr id="4" name="Content Placeholder 3">
             <a:extLst>
               <a:ext uri="{FF2B5EF4-FFF2-40B4-BE49-F238E27FC236}">
-                <a16:creationId xmlns="" xmlns:a16="http://schemas.microsoft.com/office/drawing/2014/main" id="{70555C23-EE74-41FE-A783-27210EC8D40E}"/>
+                <a16:creationId xmlns:a16="http://schemas.microsoft.com/office/drawing/2014/main" xmlns="" id="{70555C23-EE74-41FE-A783-27210EC8D40E}"/>
               </a:ext>
             </a:extLst>
           </p:cNvPr>
@@ -2294,7 +2294,7 @@
           <p:cNvPr id="5" name="Date Placeholder 4">
             <a:extLst>
               <a:ext uri="{FF2B5EF4-FFF2-40B4-BE49-F238E27FC236}">
-                <a16:creationId xmlns="" xmlns:a16="http://schemas.microsoft.com/office/drawing/2014/main" id="{D2432B00-FF5E-4908-A880-E0296BFE23D9}"/>
+                <a16:creationId xmlns:a16="http://schemas.microsoft.com/office/drawing/2014/main" xmlns="" id="{D2432B00-FF5E-4908-A880-E0296BFE23D9}"/>
               </a:ext>
             </a:extLst>
           </p:cNvPr>
@@ -2312,7 +2312,7 @@
           <a:p>
             <a:fld id="{DEB1FEE5-0530-414D-96B9-88113598593B}" type="datetimeFigureOut">
               <a:rPr lang="en-US" smtClean="0"/>
-              <a:t>7/22/2020</a:t>
+              <a:t>7/23/2020</a:t>
             </a:fld>
             <a:endParaRPr lang="en-US"/>
           </a:p>
@@ -2323,7 +2323,7 @@
           <p:cNvPr id="6" name="Footer Placeholder 5">
             <a:extLst>
               <a:ext uri="{FF2B5EF4-FFF2-40B4-BE49-F238E27FC236}">
-                <a16:creationId xmlns="" xmlns:a16="http://schemas.microsoft.com/office/drawing/2014/main" id="{DC5020A8-9B6A-4A99-A454-571B0A925DDA}"/>
+                <a16:creationId xmlns:a16="http://schemas.microsoft.com/office/drawing/2014/main" xmlns="" id="{DC5020A8-9B6A-4A99-A454-571B0A925DDA}"/>
               </a:ext>
             </a:extLst>
           </p:cNvPr>
@@ -2348,7 +2348,7 @@
           <p:cNvPr id="7" name="Slide Number Placeholder 6">
             <a:extLst>
               <a:ext uri="{FF2B5EF4-FFF2-40B4-BE49-F238E27FC236}">
-                <a16:creationId xmlns="" xmlns:a16="http://schemas.microsoft.com/office/drawing/2014/main" id="{3C03881E-EE40-41D8-877B-BFD1EA2C24A4}"/>
+                <a16:creationId xmlns:a16="http://schemas.microsoft.com/office/drawing/2014/main" xmlns="" id="{3C03881E-EE40-41D8-877B-BFD1EA2C24A4}"/>
               </a:ext>
             </a:extLst>
           </p:cNvPr>
@@ -2407,7 +2407,7 @@
           <p:cNvPr id="2" name="Title 1">
             <a:extLst>
               <a:ext uri="{FF2B5EF4-FFF2-40B4-BE49-F238E27FC236}">
-                <a16:creationId xmlns="" xmlns:a16="http://schemas.microsoft.com/office/drawing/2014/main" id="{3B0E92CF-6255-484F-A37C-173192789EA9}"/>
+                <a16:creationId xmlns:a16="http://schemas.microsoft.com/office/drawing/2014/main" xmlns="" id="{3B0E92CF-6255-484F-A37C-173192789EA9}"/>
               </a:ext>
             </a:extLst>
           </p:cNvPr>
@@ -2440,7 +2440,7 @@
           <p:cNvPr id="3" name="Text Placeholder 2">
             <a:extLst>
               <a:ext uri="{FF2B5EF4-FFF2-40B4-BE49-F238E27FC236}">
-                <a16:creationId xmlns="" xmlns:a16="http://schemas.microsoft.com/office/drawing/2014/main" id="{201695D2-4040-455D-AD38-1A19CA283522}"/>
+                <a16:creationId xmlns:a16="http://schemas.microsoft.com/office/drawing/2014/main" xmlns="" id="{201695D2-4040-455D-AD38-1A19CA283522}"/>
               </a:ext>
             </a:extLst>
           </p:cNvPr>
@@ -2511,7 +2511,7 @@
           <p:cNvPr id="4" name="Content Placeholder 3">
             <a:extLst>
               <a:ext uri="{FF2B5EF4-FFF2-40B4-BE49-F238E27FC236}">
-                <a16:creationId xmlns="" xmlns:a16="http://schemas.microsoft.com/office/drawing/2014/main" id="{0FF017E3-D5C8-4E64-8992-82BCC54FF0E8}"/>
+                <a16:creationId xmlns:a16="http://schemas.microsoft.com/office/drawing/2014/main" xmlns="" id="{0FF017E3-D5C8-4E64-8992-82BCC54FF0E8}"/>
               </a:ext>
             </a:extLst>
           </p:cNvPr>
@@ -2573,7 +2573,7 @@
           <p:cNvPr id="5" name="Text Placeholder 4">
             <a:extLst>
               <a:ext uri="{FF2B5EF4-FFF2-40B4-BE49-F238E27FC236}">
-                <a16:creationId xmlns="" xmlns:a16="http://schemas.microsoft.com/office/drawing/2014/main" id="{19D22FD8-455C-4E40-BF0A-2C055C37DD90}"/>
+                <a16:creationId xmlns:a16="http://schemas.microsoft.com/office/drawing/2014/main" xmlns="" id="{19D22FD8-455C-4E40-BF0A-2C055C37DD90}"/>
               </a:ext>
             </a:extLst>
           </p:cNvPr>
@@ -2644,7 +2644,7 @@
           <p:cNvPr id="6" name="Content Placeholder 5">
             <a:extLst>
               <a:ext uri="{FF2B5EF4-FFF2-40B4-BE49-F238E27FC236}">
-                <a16:creationId xmlns="" xmlns:a16="http://schemas.microsoft.com/office/drawing/2014/main" id="{5DA918F5-8458-4261-A81C-D7792017416B}"/>
+                <a16:creationId xmlns:a16="http://schemas.microsoft.com/office/drawing/2014/main" xmlns="" id="{5DA918F5-8458-4261-A81C-D7792017416B}"/>
               </a:ext>
             </a:extLst>
           </p:cNvPr>
@@ -2706,7 +2706,7 @@
           <p:cNvPr id="7" name="Date Placeholder 6">
             <a:extLst>
               <a:ext uri="{FF2B5EF4-FFF2-40B4-BE49-F238E27FC236}">
-                <a16:creationId xmlns="" xmlns:a16="http://schemas.microsoft.com/office/drawing/2014/main" id="{A29768BE-081C-4D7B-84DA-258D1BD21702}"/>
+                <a16:creationId xmlns:a16="http://schemas.microsoft.com/office/drawing/2014/main" xmlns="" id="{A29768BE-081C-4D7B-84DA-258D1BD21702}"/>
               </a:ext>
             </a:extLst>
           </p:cNvPr>
@@ -2724,7 +2724,7 @@
           <a:p>
             <a:fld id="{DEB1FEE5-0530-414D-96B9-88113598593B}" type="datetimeFigureOut">
               <a:rPr lang="en-US" smtClean="0"/>
-              <a:t>7/22/2020</a:t>
+              <a:t>7/23/2020</a:t>
             </a:fld>
             <a:endParaRPr lang="en-US"/>
           </a:p>
@@ -2735,7 +2735,7 @@
           <p:cNvPr id="8" name="Footer Placeholder 7">
             <a:extLst>
               <a:ext uri="{FF2B5EF4-FFF2-40B4-BE49-F238E27FC236}">
-                <a16:creationId xmlns="" xmlns:a16="http://schemas.microsoft.com/office/drawing/2014/main" id="{772AF356-5822-4E2D-A40F-68942C63AB11}"/>
+                <a16:creationId xmlns:a16="http://schemas.microsoft.com/office/drawing/2014/main" xmlns="" id="{772AF356-5822-4E2D-A40F-68942C63AB11}"/>
               </a:ext>
             </a:extLst>
           </p:cNvPr>
@@ -2760,7 +2760,7 @@
           <p:cNvPr id="9" name="Slide Number Placeholder 8">
             <a:extLst>
               <a:ext uri="{FF2B5EF4-FFF2-40B4-BE49-F238E27FC236}">
-                <a16:creationId xmlns="" xmlns:a16="http://schemas.microsoft.com/office/drawing/2014/main" id="{CE2EAFCF-FE8A-4ADD-ACF3-C5E3A9B8FC90}"/>
+                <a16:creationId xmlns:a16="http://schemas.microsoft.com/office/drawing/2014/main" xmlns="" id="{CE2EAFCF-FE8A-4ADD-ACF3-C5E3A9B8FC90}"/>
               </a:ext>
             </a:extLst>
           </p:cNvPr>
@@ -2819,7 +2819,7 @@
           <p:cNvPr id="2" name="Title 1">
             <a:extLst>
               <a:ext uri="{FF2B5EF4-FFF2-40B4-BE49-F238E27FC236}">
-                <a16:creationId xmlns="" xmlns:a16="http://schemas.microsoft.com/office/drawing/2014/main" id="{8E624107-501F-45D7-A4B8-DEDC2A0852D7}"/>
+                <a16:creationId xmlns:a16="http://schemas.microsoft.com/office/drawing/2014/main" xmlns="" id="{8E624107-501F-45D7-A4B8-DEDC2A0852D7}"/>
               </a:ext>
             </a:extLst>
           </p:cNvPr>
@@ -2847,7 +2847,7 @@
           <p:cNvPr id="3" name="Date Placeholder 2">
             <a:extLst>
               <a:ext uri="{FF2B5EF4-FFF2-40B4-BE49-F238E27FC236}">
-                <a16:creationId xmlns="" xmlns:a16="http://schemas.microsoft.com/office/drawing/2014/main" id="{7A44E379-05D5-4408-90DA-6DA7EA1AB70F}"/>
+                <a16:creationId xmlns:a16="http://schemas.microsoft.com/office/drawing/2014/main" xmlns="" id="{7A44E379-05D5-4408-90DA-6DA7EA1AB70F}"/>
               </a:ext>
             </a:extLst>
           </p:cNvPr>
@@ -2865,7 +2865,7 @@
           <a:p>
             <a:fld id="{DEB1FEE5-0530-414D-96B9-88113598593B}" type="datetimeFigureOut">
               <a:rPr lang="en-US" smtClean="0"/>
-              <a:t>7/22/2020</a:t>
+              <a:t>7/23/2020</a:t>
             </a:fld>
             <a:endParaRPr lang="en-US"/>
           </a:p>
@@ -2876,7 +2876,7 @@
           <p:cNvPr id="4" name="Footer Placeholder 3">
             <a:extLst>
               <a:ext uri="{FF2B5EF4-FFF2-40B4-BE49-F238E27FC236}">
-                <a16:creationId xmlns="" xmlns:a16="http://schemas.microsoft.com/office/drawing/2014/main" id="{2E310503-419E-4308-8BB8-B705684BDD44}"/>
+                <a16:creationId xmlns:a16="http://schemas.microsoft.com/office/drawing/2014/main" xmlns="" id="{2E310503-419E-4308-8BB8-B705684BDD44}"/>
               </a:ext>
             </a:extLst>
           </p:cNvPr>
@@ -2901,7 +2901,7 @@
           <p:cNvPr id="5" name="Slide Number Placeholder 4">
             <a:extLst>
               <a:ext uri="{FF2B5EF4-FFF2-40B4-BE49-F238E27FC236}">
-                <a16:creationId xmlns="" xmlns:a16="http://schemas.microsoft.com/office/drawing/2014/main" id="{F41B98EC-28A6-4B82-9FEE-DE4851173E03}"/>
+                <a16:creationId xmlns:a16="http://schemas.microsoft.com/office/drawing/2014/main" xmlns="" id="{F41B98EC-28A6-4B82-9FEE-DE4851173E03}"/>
               </a:ext>
             </a:extLst>
           </p:cNvPr>
@@ -2960,7 +2960,7 @@
           <p:cNvPr id="2" name="Date Placeholder 1">
             <a:extLst>
               <a:ext uri="{FF2B5EF4-FFF2-40B4-BE49-F238E27FC236}">
-                <a16:creationId xmlns="" xmlns:a16="http://schemas.microsoft.com/office/drawing/2014/main" id="{728D7F1C-FA4D-420E-A817-8EF8AAFB30E7}"/>
+                <a16:creationId xmlns:a16="http://schemas.microsoft.com/office/drawing/2014/main" xmlns="" id="{728D7F1C-FA4D-420E-A817-8EF8AAFB30E7}"/>
               </a:ext>
             </a:extLst>
           </p:cNvPr>
@@ -2978,7 +2978,7 @@
           <a:p>
             <a:fld id="{DEB1FEE5-0530-414D-96B9-88113598593B}" type="datetimeFigureOut">
               <a:rPr lang="en-US" smtClean="0"/>
-              <a:t>7/22/2020</a:t>
+              <a:t>7/23/2020</a:t>
             </a:fld>
             <a:endParaRPr lang="en-US"/>
           </a:p>
@@ -2989,7 +2989,7 @@
           <p:cNvPr id="3" name="Footer Placeholder 2">
             <a:extLst>
               <a:ext uri="{FF2B5EF4-FFF2-40B4-BE49-F238E27FC236}">
-                <a16:creationId xmlns="" xmlns:a16="http://schemas.microsoft.com/office/drawing/2014/main" id="{96D21050-7DE7-405B-B576-E7C8CD9B36F8}"/>
+                <a16:creationId xmlns:a16="http://schemas.microsoft.com/office/drawing/2014/main" xmlns="" id="{96D21050-7DE7-405B-B576-E7C8CD9B36F8}"/>
               </a:ext>
             </a:extLst>
           </p:cNvPr>
@@ -3014,7 +3014,7 @@
           <p:cNvPr id="4" name="Slide Number Placeholder 3">
             <a:extLst>
               <a:ext uri="{FF2B5EF4-FFF2-40B4-BE49-F238E27FC236}">
-                <a16:creationId xmlns="" xmlns:a16="http://schemas.microsoft.com/office/drawing/2014/main" id="{656605F2-35DB-4B9A-BE0E-452FAAEA2088}"/>
+                <a16:creationId xmlns:a16="http://schemas.microsoft.com/office/drawing/2014/main" xmlns="" id="{656605F2-35DB-4B9A-BE0E-452FAAEA2088}"/>
               </a:ext>
             </a:extLst>
           </p:cNvPr>
@@ -3073,7 +3073,7 @@
           <p:cNvPr id="2" name="Title 1">
             <a:extLst>
               <a:ext uri="{FF2B5EF4-FFF2-40B4-BE49-F238E27FC236}">
-                <a16:creationId xmlns="" xmlns:a16="http://schemas.microsoft.com/office/drawing/2014/main" id="{1153D1AA-88FE-4F17-95D7-C4CA99E0E475}"/>
+                <a16:creationId xmlns:a16="http://schemas.microsoft.com/office/drawing/2014/main" xmlns="" id="{1153D1AA-88FE-4F17-95D7-C4CA99E0E475}"/>
               </a:ext>
             </a:extLst>
           </p:cNvPr>
@@ -3110,7 +3110,7 @@
           <p:cNvPr id="3" name="Content Placeholder 2">
             <a:extLst>
               <a:ext uri="{FF2B5EF4-FFF2-40B4-BE49-F238E27FC236}">
-                <a16:creationId xmlns="" xmlns:a16="http://schemas.microsoft.com/office/drawing/2014/main" id="{B3CA30D2-F010-4582-963F-C5A2305FBB1D}"/>
+                <a16:creationId xmlns:a16="http://schemas.microsoft.com/office/drawing/2014/main" xmlns="" id="{B3CA30D2-F010-4582-963F-C5A2305FBB1D}"/>
               </a:ext>
             </a:extLst>
           </p:cNvPr>
@@ -3200,7 +3200,7 @@
           <p:cNvPr id="4" name="Text Placeholder 3">
             <a:extLst>
               <a:ext uri="{FF2B5EF4-FFF2-40B4-BE49-F238E27FC236}">
-                <a16:creationId xmlns="" xmlns:a16="http://schemas.microsoft.com/office/drawing/2014/main" id="{E2CBA6F8-6D19-4DDA-A3B5-F4CA8C531E84}"/>
+                <a16:creationId xmlns:a16="http://schemas.microsoft.com/office/drawing/2014/main" xmlns="" id="{E2CBA6F8-6D19-4DDA-A3B5-F4CA8C531E84}"/>
               </a:ext>
             </a:extLst>
           </p:cNvPr>
@@ -3271,7 +3271,7 @@
           <p:cNvPr id="5" name="Date Placeholder 4">
             <a:extLst>
               <a:ext uri="{FF2B5EF4-FFF2-40B4-BE49-F238E27FC236}">
-                <a16:creationId xmlns="" xmlns:a16="http://schemas.microsoft.com/office/drawing/2014/main" id="{8595EA55-A261-4955-A940-CA2E1EB4ADEF}"/>
+                <a16:creationId xmlns:a16="http://schemas.microsoft.com/office/drawing/2014/main" xmlns="" id="{8595EA55-A261-4955-A940-CA2E1EB4ADEF}"/>
               </a:ext>
             </a:extLst>
           </p:cNvPr>
@@ -3289,7 +3289,7 @@
           <a:p>
             <a:fld id="{DEB1FEE5-0530-414D-96B9-88113598593B}" type="datetimeFigureOut">
               <a:rPr lang="en-US" smtClean="0"/>
-              <a:t>7/22/2020</a:t>
+              <a:t>7/23/2020</a:t>
             </a:fld>
             <a:endParaRPr lang="en-US"/>
           </a:p>
@@ -3300,7 +3300,7 @@
           <p:cNvPr id="6" name="Footer Placeholder 5">
             <a:extLst>
               <a:ext uri="{FF2B5EF4-FFF2-40B4-BE49-F238E27FC236}">
-                <a16:creationId xmlns="" xmlns:a16="http://schemas.microsoft.com/office/drawing/2014/main" id="{DEFB2E61-F0ED-4E9A-92DE-1D821AFEA816}"/>
+                <a16:creationId xmlns:a16="http://schemas.microsoft.com/office/drawing/2014/main" xmlns="" id="{DEFB2E61-F0ED-4E9A-92DE-1D821AFEA816}"/>
               </a:ext>
             </a:extLst>
           </p:cNvPr>
@@ -3325,7 +3325,7 @@
           <p:cNvPr id="7" name="Slide Number Placeholder 6">
             <a:extLst>
               <a:ext uri="{FF2B5EF4-FFF2-40B4-BE49-F238E27FC236}">
-                <a16:creationId xmlns="" xmlns:a16="http://schemas.microsoft.com/office/drawing/2014/main" id="{AF011083-B1E6-4F06-A0B3-AA1109E118D2}"/>
+                <a16:creationId xmlns:a16="http://schemas.microsoft.com/office/drawing/2014/main" xmlns="" id="{AF011083-B1E6-4F06-A0B3-AA1109E118D2}"/>
               </a:ext>
             </a:extLst>
           </p:cNvPr>
@@ -3384,7 +3384,7 @@
           <p:cNvPr id="2" name="Title 1">
             <a:extLst>
               <a:ext uri="{FF2B5EF4-FFF2-40B4-BE49-F238E27FC236}">
-                <a16:creationId xmlns="" xmlns:a16="http://schemas.microsoft.com/office/drawing/2014/main" id="{7ECE586C-B5DA-4611-BD4B-6DA0960072AD}"/>
+                <a16:creationId xmlns:a16="http://schemas.microsoft.com/office/drawing/2014/main" xmlns="" id="{7ECE586C-B5DA-4611-BD4B-6DA0960072AD}"/>
               </a:ext>
             </a:extLst>
           </p:cNvPr>
@@ -3421,7 +3421,7 @@
           <p:cNvPr id="3" name="Picture Placeholder 2">
             <a:extLst>
               <a:ext uri="{FF2B5EF4-FFF2-40B4-BE49-F238E27FC236}">
-                <a16:creationId xmlns="" xmlns:a16="http://schemas.microsoft.com/office/drawing/2014/main" id="{9A3DC055-F1DF-4AFF-9414-BB450BE32FC9}"/>
+                <a16:creationId xmlns:a16="http://schemas.microsoft.com/office/drawing/2014/main" xmlns="" id="{9A3DC055-F1DF-4AFF-9414-BB450BE32FC9}"/>
               </a:ext>
             </a:extLst>
           </p:cNvPr>
@@ -3488,7 +3488,7 @@
           <p:cNvPr id="4" name="Text Placeholder 3">
             <a:extLst>
               <a:ext uri="{FF2B5EF4-FFF2-40B4-BE49-F238E27FC236}">
-                <a16:creationId xmlns="" xmlns:a16="http://schemas.microsoft.com/office/drawing/2014/main" id="{E80069AA-1402-4E00-B82A-28C4C698AAB0}"/>
+                <a16:creationId xmlns:a16="http://schemas.microsoft.com/office/drawing/2014/main" xmlns="" id="{E80069AA-1402-4E00-B82A-28C4C698AAB0}"/>
               </a:ext>
             </a:extLst>
           </p:cNvPr>
@@ -3559,7 +3559,7 @@
           <p:cNvPr id="5" name="Date Placeholder 4">
             <a:extLst>
               <a:ext uri="{FF2B5EF4-FFF2-40B4-BE49-F238E27FC236}">
-                <a16:creationId xmlns="" xmlns:a16="http://schemas.microsoft.com/office/drawing/2014/main" id="{B1728C35-25A5-47A9-A8D0-0E1D77338D61}"/>
+                <a16:creationId xmlns:a16="http://schemas.microsoft.com/office/drawing/2014/main" xmlns="" id="{B1728C35-25A5-47A9-A8D0-0E1D77338D61}"/>
               </a:ext>
             </a:extLst>
           </p:cNvPr>
@@ -3577,7 +3577,7 @@
           <a:p>
             <a:fld id="{DEB1FEE5-0530-414D-96B9-88113598593B}" type="datetimeFigureOut">
               <a:rPr lang="en-US" smtClean="0"/>
-              <a:t>7/22/2020</a:t>
+              <a:t>7/23/2020</a:t>
             </a:fld>
             <a:endParaRPr lang="en-US"/>
           </a:p>
@@ -3588,7 +3588,7 @@
           <p:cNvPr id="6" name="Footer Placeholder 5">
             <a:extLst>
               <a:ext uri="{FF2B5EF4-FFF2-40B4-BE49-F238E27FC236}">
-                <a16:creationId xmlns="" xmlns:a16="http://schemas.microsoft.com/office/drawing/2014/main" id="{C4FD86A7-6C34-4A91-B9C7-81B7B12D819D}"/>
+                <a16:creationId xmlns:a16="http://schemas.microsoft.com/office/drawing/2014/main" xmlns="" id="{C4FD86A7-6C34-4A91-B9C7-81B7B12D819D}"/>
               </a:ext>
             </a:extLst>
           </p:cNvPr>
@@ -3613,7 +3613,7 @@
           <p:cNvPr id="7" name="Slide Number Placeholder 6">
             <a:extLst>
               <a:ext uri="{FF2B5EF4-FFF2-40B4-BE49-F238E27FC236}">
-                <a16:creationId xmlns="" xmlns:a16="http://schemas.microsoft.com/office/drawing/2014/main" id="{38B27316-0CF5-4999-9B89-9F2F005954B9}"/>
+                <a16:creationId xmlns:a16="http://schemas.microsoft.com/office/drawing/2014/main" xmlns="" id="{38B27316-0CF5-4999-9B89-9F2F005954B9}"/>
               </a:ext>
             </a:extLst>
           </p:cNvPr>
@@ -3677,7 +3677,7 @@
           <p:cNvPr id="2" name="Title Placeholder 1">
             <a:extLst>
               <a:ext uri="{FF2B5EF4-FFF2-40B4-BE49-F238E27FC236}">
-                <a16:creationId xmlns="" xmlns:a16="http://schemas.microsoft.com/office/drawing/2014/main" id="{9DE62B2E-65B8-4903-BEA2-D5F93D68B41C}"/>
+                <a16:creationId xmlns:a16="http://schemas.microsoft.com/office/drawing/2014/main" xmlns="" id="{9DE62B2E-65B8-4903-BEA2-D5F93D68B41C}"/>
               </a:ext>
             </a:extLst>
           </p:cNvPr>
@@ -3715,7 +3715,7 @@
           <p:cNvPr id="3" name="Text Placeholder 2">
             <a:extLst>
               <a:ext uri="{FF2B5EF4-FFF2-40B4-BE49-F238E27FC236}">
-                <a16:creationId xmlns="" xmlns:a16="http://schemas.microsoft.com/office/drawing/2014/main" id="{924C27DE-3C34-4851-8A03-790BC224042F}"/>
+                <a16:creationId xmlns:a16="http://schemas.microsoft.com/office/drawing/2014/main" xmlns="" id="{924C27DE-3C34-4851-8A03-790BC224042F}"/>
               </a:ext>
             </a:extLst>
           </p:cNvPr>
@@ -3782,7 +3782,7 @@
           <p:cNvPr id="4" name="Date Placeholder 3">
             <a:extLst>
               <a:ext uri="{FF2B5EF4-FFF2-40B4-BE49-F238E27FC236}">
-                <a16:creationId xmlns="" xmlns:a16="http://schemas.microsoft.com/office/drawing/2014/main" id="{56755826-7D96-4B2B-B335-D170E4D2ADCB}"/>
+                <a16:creationId xmlns:a16="http://schemas.microsoft.com/office/drawing/2014/main" xmlns="" id="{56755826-7D96-4B2B-B335-D170E4D2ADCB}"/>
               </a:ext>
             </a:extLst>
           </p:cNvPr>
@@ -3818,7 +3818,7 @@
           <a:p>
             <a:fld id="{DEB1FEE5-0530-414D-96B9-88113598593B}" type="datetimeFigureOut">
               <a:rPr lang="en-US" smtClean="0"/>
-              <a:t>7/22/2020</a:t>
+              <a:t>7/23/2020</a:t>
             </a:fld>
             <a:endParaRPr lang="en-US"/>
           </a:p>
@@ -3829,7 +3829,7 @@
           <p:cNvPr id="5" name="Footer Placeholder 4">
             <a:extLst>
               <a:ext uri="{FF2B5EF4-FFF2-40B4-BE49-F238E27FC236}">
-                <a16:creationId xmlns="" xmlns:a16="http://schemas.microsoft.com/office/drawing/2014/main" id="{EE424111-E5A1-4D26-98F6-4E1404CCB4F6}"/>
+                <a16:creationId xmlns:a16="http://schemas.microsoft.com/office/drawing/2014/main" xmlns="" id="{EE424111-E5A1-4D26-98F6-4E1404CCB4F6}"/>
               </a:ext>
             </a:extLst>
           </p:cNvPr>
@@ -3872,7 +3872,7 @@
           <p:cNvPr id="6" name="Slide Number Placeholder 5">
             <a:extLst>
               <a:ext uri="{FF2B5EF4-FFF2-40B4-BE49-F238E27FC236}">
-                <a16:creationId xmlns="" xmlns:a16="http://schemas.microsoft.com/office/drawing/2014/main" id="{703F543F-736F-4992-B07A-26CD75B8F42A}"/>
+                <a16:creationId xmlns:a16="http://schemas.microsoft.com/office/drawing/2014/main" xmlns="" id="{703F543F-736F-4992-B07A-26CD75B8F42A}"/>
               </a:ext>
             </a:extLst>
           </p:cNvPr>
@@ -4248,7 +4248,7 @@
           <p:cNvPr id="2061" name="Picture 2060" descr="A picture containing computer, sitting, dark, computer&#10;&#10;Description automatically generated">
             <a:extLst>
               <a:ext uri="{FF2B5EF4-FFF2-40B4-BE49-F238E27FC236}">
-                <a16:creationId xmlns="" xmlns:a16="http://schemas.microsoft.com/office/drawing/2014/main" id="{D5D0632C-9966-4876-8358-E443D87A54E6}"/>
+                <a16:creationId xmlns:a16="http://schemas.microsoft.com/office/drawing/2014/main" xmlns="" id="{D5D0632C-9966-4876-8358-E443D87A54E6}"/>
               </a:ext>
             </a:extLst>
           </p:cNvPr>
@@ -4284,7 +4284,7 @@
           <p:cNvPr id="22" name="Rectangle 21">
             <a:extLst>
               <a:ext uri="{FF2B5EF4-FFF2-40B4-BE49-F238E27FC236}">
-                <a16:creationId xmlns="" xmlns:a16="http://schemas.microsoft.com/office/drawing/2014/main" id="{DA00872A-024C-4AA7-9351-5188D1F15D86}"/>
+                <a16:creationId xmlns:a16="http://schemas.microsoft.com/office/drawing/2014/main" xmlns="" id="{DA00872A-024C-4AA7-9351-5188D1F15D86}"/>
               </a:ext>
             </a:extLst>
           </p:cNvPr>
@@ -4339,7 +4339,7 @@
           <p:cNvPr id="3" name="Rectangle 2">
             <a:extLst>
               <a:ext uri="{FF2B5EF4-FFF2-40B4-BE49-F238E27FC236}">
-                <a16:creationId xmlns="" xmlns:a16="http://schemas.microsoft.com/office/drawing/2014/main" id="{44758A41-D956-4A9D-86D3-27DC35014B55}"/>
+                <a16:creationId xmlns:a16="http://schemas.microsoft.com/office/drawing/2014/main" xmlns="" id="{44758A41-D956-4A9D-86D3-27DC35014B55}"/>
               </a:ext>
             </a:extLst>
           </p:cNvPr>
@@ -4391,7 +4391,7 @@
           <p:cNvPr id="2" name="Picture 1" descr="A close up of a logo&#10;&#10;Description automatically generated">
             <a:extLst>
               <a:ext uri="{FF2B5EF4-FFF2-40B4-BE49-F238E27FC236}">
-                <a16:creationId xmlns="" xmlns:a16="http://schemas.microsoft.com/office/drawing/2014/main" id="{148A4CA5-114C-44CD-B175-E3231477B3CA}"/>
+                <a16:creationId xmlns:a16="http://schemas.microsoft.com/office/drawing/2014/main" xmlns="" id="{148A4CA5-114C-44CD-B175-E3231477B3CA}"/>
               </a:ext>
             </a:extLst>
           </p:cNvPr>
@@ -4427,7 +4427,7 @@
           <p:cNvPr id="18" name="Graphic 17">
             <a:extLst>
               <a:ext uri="{FF2B5EF4-FFF2-40B4-BE49-F238E27FC236}">
-                <a16:creationId xmlns="" xmlns:a16="http://schemas.microsoft.com/office/drawing/2014/main" id="{B294849B-3AA5-41A8-8E0E-31C068B40E0D}"/>
+                <a16:creationId xmlns:a16="http://schemas.microsoft.com/office/drawing/2014/main" xmlns="" id="{B294849B-3AA5-41A8-8E0E-31C068B40E0D}"/>
               </a:ext>
             </a:extLst>
           </p:cNvPr>
@@ -4443,7 +4443,7 @@
                 <a14:useLocalDpi xmlns:a14="http://schemas.microsoft.com/office/drawing/2010/main" val="0"/>
               </a:ext>
               <a:ext uri="{96DAC541-7B7A-43D3-8B79-37D633B846F1}">
-                <asvg:svgBlip xmlns="" xmlns:asvg="http://schemas.microsoft.com/office/drawing/2016/SVG/main" r:embed="rId6"/>
+                <asvg:svgBlip xmlns:asvg="http://schemas.microsoft.com/office/drawing/2016/SVG/main" xmlns="" r:embed="rId6"/>
               </a:ext>
             </a:extLst>
           </a:blip>
@@ -4465,7 +4465,7 @@
           <p:cNvPr id="19" name="Picture 18" descr="A close up of a logo&#10;&#10;Description automatically generated">
             <a:extLst>
               <a:ext uri="{FF2B5EF4-FFF2-40B4-BE49-F238E27FC236}">
-                <a16:creationId xmlns="" xmlns:a16="http://schemas.microsoft.com/office/drawing/2014/main" id="{DE310AFD-E005-4F0F-A7A3-651347DEB364}"/>
+                <a16:creationId xmlns:a16="http://schemas.microsoft.com/office/drawing/2014/main" xmlns="" id="{DE310AFD-E005-4F0F-A7A3-651347DEB364}"/>
               </a:ext>
             </a:extLst>
           </p:cNvPr>
@@ -4501,7 +4501,7 @@
           <p:cNvPr id="20" name="Picture 19" descr="A close up of a logo&#10;&#10;Description automatically generated">
             <a:extLst>
               <a:ext uri="{FF2B5EF4-FFF2-40B4-BE49-F238E27FC236}">
-                <a16:creationId xmlns="" xmlns:a16="http://schemas.microsoft.com/office/drawing/2014/main" id="{3FE3DF3C-BD29-4CC6-9323-58564DFA2D0D}"/>
+                <a16:creationId xmlns:a16="http://schemas.microsoft.com/office/drawing/2014/main" xmlns="" id="{3FE3DF3C-BD29-4CC6-9323-58564DFA2D0D}"/>
               </a:ext>
             </a:extLst>
           </p:cNvPr>
@@ -4537,7 +4537,7 @@
           <p:cNvPr id="21" name="TextBox 20">
             <a:extLst>
               <a:ext uri="{FF2B5EF4-FFF2-40B4-BE49-F238E27FC236}">
-                <a16:creationId xmlns="" xmlns:a16="http://schemas.microsoft.com/office/drawing/2014/main" id="{373B7BFB-9EC9-45C0-B162-FC63EB14F34D}"/>
+                <a16:creationId xmlns:a16="http://schemas.microsoft.com/office/drawing/2014/main" xmlns="" id="{373B7BFB-9EC9-45C0-B162-FC63EB14F34D}"/>
               </a:ext>
             </a:extLst>
           </p:cNvPr>
@@ -4582,7 +4582,7 @@
           <p:cNvPr id="5" name="Rectangle 4">
             <a:extLst>
               <a:ext uri="{FF2B5EF4-FFF2-40B4-BE49-F238E27FC236}">
-                <a16:creationId xmlns="" xmlns:a16="http://schemas.microsoft.com/office/drawing/2014/main" id="{73F3983B-D723-43BC-9674-C4F5FC89EDA4}"/>
+                <a16:creationId xmlns:a16="http://schemas.microsoft.com/office/drawing/2014/main" xmlns="" id="{73F3983B-D723-43BC-9674-C4F5FC89EDA4}"/>
               </a:ext>
             </a:extLst>
           </p:cNvPr>
@@ -4634,7 +4634,7 @@
           <p:cNvPr id="6" name="TextBox 5">
             <a:extLst>
               <a:ext uri="{FF2B5EF4-FFF2-40B4-BE49-F238E27FC236}">
-                <a16:creationId xmlns="" xmlns:a16="http://schemas.microsoft.com/office/drawing/2014/main" id="{FC488D3B-6AAE-4AE0-8EC5-8137E4372930}"/>
+                <a16:creationId xmlns:a16="http://schemas.microsoft.com/office/drawing/2014/main" xmlns="" id="{FC488D3B-6AAE-4AE0-8EC5-8137E4372930}"/>
               </a:ext>
             </a:extLst>
           </p:cNvPr>
@@ -4721,7 +4721,7 @@
           <p:cNvPr id="53" name="TextBox 52">
             <a:extLst>
               <a:ext uri="{FF2B5EF4-FFF2-40B4-BE49-F238E27FC236}">
-                <a16:creationId xmlns="" xmlns:a16="http://schemas.microsoft.com/office/drawing/2014/main" id="{689D7BB0-D4C0-4982-A37D-1738AD6C6BDD}"/>
+                <a16:creationId xmlns:a16="http://schemas.microsoft.com/office/drawing/2014/main" xmlns="" id="{689D7BB0-D4C0-4982-A37D-1738AD6C6BDD}"/>
               </a:ext>
             </a:extLst>
           </p:cNvPr>
@@ -4762,7 +4762,7 @@
           <p:cNvPr id="4" name="Rectangle 3">
             <a:extLst>
               <a:ext uri="{FF2B5EF4-FFF2-40B4-BE49-F238E27FC236}">
-                <a16:creationId xmlns="" xmlns:a16="http://schemas.microsoft.com/office/drawing/2014/main" id="{0B493696-939F-4054-9AFA-41717E6486DF}"/>
+                <a16:creationId xmlns:a16="http://schemas.microsoft.com/office/drawing/2014/main" xmlns="" id="{0B493696-939F-4054-9AFA-41717E6486DF}"/>
               </a:ext>
             </a:extLst>
           </p:cNvPr>
@@ -4816,7 +4816,7 @@
           <p:cNvPr id="8" name="TextBox 7">
             <a:extLst>
               <a:ext uri="{FF2B5EF4-FFF2-40B4-BE49-F238E27FC236}">
-                <a16:creationId xmlns="" xmlns:a16="http://schemas.microsoft.com/office/drawing/2014/main" id="{B3428249-9057-4654-AF55-51618D5019AD}"/>
+                <a16:creationId xmlns:a16="http://schemas.microsoft.com/office/drawing/2014/main" xmlns="" id="{B3428249-9057-4654-AF55-51618D5019AD}"/>
               </a:ext>
             </a:extLst>
           </p:cNvPr>
@@ -4921,7 +4921,7 @@
           <p:cNvPr id="12" name="Shape 5020">
             <a:extLst>
               <a:ext uri="{FF2B5EF4-FFF2-40B4-BE49-F238E27FC236}">
-                <a16:creationId xmlns="" xmlns:a16="http://schemas.microsoft.com/office/drawing/2014/main" id="{FF8FD453-26E4-49E6-8B8C-BB54335C53E8}"/>
+                <a16:creationId xmlns:a16="http://schemas.microsoft.com/office/drawing/2014/main" xmlns="" id="{FF8FD453-26E4-49E6-8B8C-BB54335C53E8}"/>
               </a:ext>
             </a:extLst>
           </p:cNvPr>
@@ -5198,7 +5198,7 @@
           <p:cNvPr id="14" name="Freeform 18">
             <a:extLst>
               <a:ext uri="{FF2B5EF4-FFF2-40B4-BE49-F238E27FC236}">
-                <a16:creationId xmlns="" xmlns:a16="http://schemas.microsoft.com/office/drawing/2014/main" id="{5B5EB228-D146-4571-95D5-B59DAA7A4BBA}"/>
+                <a16:creationId xmlns:a16="http://schemas.microsoft.com/office/drawing/2014/main" xmlns="" id="{5B5EB228-D146-4571-95D5-B59DAA7A4BBA}"/>
               </a:ext>
             </a:extLst>
           </p:cNvPr>
@@ -6049,66 +6049,6 @@
       </p:sp>
       <p:sp>
         <p:nvSpPr>
-          <p:cNvPr id="3" name="Espace réservé du contenu 2"/>
-          <p:cNvSpPr>
-            <a:spLocks noGrp="1"/>
-          </p:cNvSpPr>
-          <p:nvPr>
-            <p:ph idx="1"/>
-          </p:nvPr>
-        </p:nvSpPr>
-        <p:spPr/>
-        <p:txBody>
-          <a:bodyPr/>
-          <a:lstStyle/>
-          <a:p>
-            <a:endParaRPr lang="fr-BE" dirty="0"/>
-          </a:p>
-        </p:txBody>
-      </p:sp>
-      <p:pic>
-        <p:nvPicPr>
-          <p:cNvPr id="4098" name="Picture 2" descr="https://scontent-vie1-1.xx.fbcdn.net/v/t1.15752-9/110250891_2389895934637943_3948743265641365441_n.png?_nc_cat=108&amp;_nc_sid=b96e70&amp;_nc_ohc=yCriYSCLdYcAX9sTpS9&amp;_nc_oc=AQm9n-8zcro1F6zlWESJWNg8WfAkJWJCLkne6Nlox_6xCdt_ADHxho0GjOTTTYcA6T-y9c1nc-EX0UqoXZ3B7WsF&amp;_nc_ht=scontent-vie1-1.xx&amp;oh=a92de1df03633bb16b28c02c6be017f4&amp;oe=5F3E5791"/>
-          <p:cNvPicPr>
-            <a:picLocks noChangeAspect="1" noChangeArrowheads="1"/>
-          </p:cNvPicPr>
-          <p:nvPr/>
-        </p:nvPicPr>
-        <p:blipFill>
-          <a:blip r:embed="rId2">
-            <a:extLst>
-              <a:ext uri="{28A0092B-C50C-407E-A947-70E740481C1C}">
-                <a14:useLocalDpi xmlns:a14="http://schemas.microsoft.com/office/drawing/2010/main" val="0"/>
-              </a:ext>
-            </a:extLst>
-          </a:blip>
-          <a:srcRect/>
-          <a:stretch>
-            <a:fillRect/>
-          </a:stretch>
-        </p:blipFill>
-        <p:spPr bwMode="auto">
-          <a:xfrm>
-            <a:off x="299954" y="465222"/>
-            <a:ext cx="11633846" cy="6144126"/>
-          </a:xfrm>
-          <a:prstGeom prst="rect">
-            <a:avLst/>
-          </a:prstGeom>
-          <a:noFill/>
-          <a:extLst>
-            <a:ext uri="{909E8E84-426E-40DD-AFC4-6F175D3DCCD1}">
-              <a14:hiddenFill xmlns:a14="http://schemas.microsoft.com/office/drawing/2010/main">
-                <a:solidFill>
-                  <a:srgbClr val="FFFFFF"/>
-                </a:solidFill>
-              </a14:hiddenFill>
-            </a:ext>
-          </a:extLst>
-        </p:spPr>
-      </p:pic>
-      <p:sp>
-        <p:nvSpPr>
           <p:cNvPr id="4" name="ZoneTexte 3"/>
           <p:cNvSpPr txBox="1"/>
           <p:nvPr/>
@@ -6133,34 +6073,40 @@
               <a:rPr lang="fr-BE" sz="1600" dirty="0" err="1" smtClean="0"/>
               <a:t>Overview</a:t>
             </a:r>
-            <a:r>
-              <a:rPr lang="fr-BE" sz="1600" dirty="0" smtClean="0"/>
-              <a:t> of the </a:t>
-            </a:r>
-            <a:r>
-              <a:rPr lang="fr-BE" sz="1600" dirty="0" err="1" smtClean="0"/>
-              <a:t>resources</a:t>
-            </a:r>
-            <a:r>
-              <a:rPr lang="fr-BE" sz="1600" dirty="0" smtClean="0"/>
-              <a:t> </a:t>
-            </a:r>
-            <a:r>
-              <a:rPr lang="fr-BE" sz="1600" dirty="0" err="1" smtClean="0"/>
-              <a:t>being</a:t>
-            </a:r>
-            <a:r>
-              <a:rPr lang="fr-BE" sz="1600" dirty="0" smtClean="0"/>
-              <a:t> </a:t>
-            </a:r>
-            <a:r>
-              <a:rPr lang="fr-BE" sz="1600" dirty="0" err="1" smtClean="0"/>
-              <a:t>deployed</a:t>
-            </a:r>
             <a:endParaRPr lang="fr-BE" sz="1600" dirty="0"/>
           </a:p>
         </p:txBody>
       </p:sp>
+      <p:pic>
+        <p:nvPicPr>
+          <p:cNvPr id="5" name="Image 4"/>
+          <p:cNvPicPr>
+            <a:picLocks noChangeAspect="1"/>
+          </p:cNvPicPr>
+          <p:nvPr/>
+        </p:nvPicPr>
+        <p:blipFill>
+          <a:blip r:embed="rId2">
+            <a:extLst>
+              <a:ext uri="{28A0092B-C50C-407E-A947-70E740481C1C}">
+                <a14:useLocalDpi xmlns:a14="http://schemas.microsoft.com/office/drawing/2010/main" val="0"/>
+              </a:ext>
+            </a:extLst>
+          </a:blip>
+          <a:stretch>
+            <a:fillRect/>
+          </a:stretch>
+        </p:blipFill>
+        <p:spPr>
+          <a:xfrm>
+            <a:off x="642427" y="465222"/>
+            <a:ext cx="10844723" cy="6079832"/>
+          </a:xfrm>
+          <a:prstGeom prst="rect">
+            <a:avLst/>
+          </a:prstGeom>
+        </p:spPr>
+      </p:pic>
     </p:spTree>
     <p:extLst>
       <p:ext uri="{BB962C8B-B14F-4D97-AF65-F5344CB8AC3E}">
@@ -6191,47 +6137,6 @@
           <a:chExt cx="0" cy="0"/>
         </a:xfrm>
       </p:grpSpPr>
-      <p:pic>
-        <p:nvPicPr>
-          <p:cNvPr id="3074" name="Picture 2" descr="https://scontent-vie1-1.xx.fbcdn.net/v/t1.15752-9/110571762_953636138415219_2542772441101462574_n.jpg?_nc_cat=108&amp;_nc_sid=b96e70&amp;_nc_ohc=50AdPO1_CKQAX81QvUv&amp;_nc_ht=scontent-vie1-1.xx&amp;oh=0c2ba391498e0bf5229b48a4843bb02e&amp;oe=5F3F63B8"/>
-          <p:cNvPicPr>
-            <a:picLocks noChangeAspect="1" noChangeArrowheads="1"/>
-          </p:cNvPicPr>
-          <p:nvPr/>
-        </p:nvPicPr>
-        <p:blipFill>
-          <a:blip r:embed="rId2">
-            <a:extLst>
-              <a:ext uri="{28A0092B-C50C-407E-A947-70E740481C1C}">
-                <a14:useLocalDpi xmlns:a14="http://schemas.microsoft.com/office/drawing/2010/main" val="0"/>
-              </a:ext>
-            </a:extLst>
-          </a:blip>
-          <a:srcRect/>
-          <a:stretch>
-            <a:fillRect/>
-          </a:stretch>
-        </p:blipFill>
-        <p:spPr bwMode="auto">
-          <a:xfrm>
-            <a:off x="2144430" y="365125"/>
-            <a:ext cx="6523517" cy="6374020"/>
-          </a:xfrm>
-          <a:prstGeom prst="rect">
-            <a:avLst/>
-          </a:prstGeom>
-          <a:noFill/>
-          <a:extLst>
-            <a:ext uri="{909E8E84-426E-40DD-AFC4-6F175D3DCCD1}">
-              <a14:hiddenFill xmlns:a14="http://schemas.microsoft.com/office/drawing/2010/main">
-                <a:solidFill>
-                  <a:srgbClr val="FFFFFF"/>
-                </a:solidFill>
-              </a14:hiddenFill>
-            </a:ext>
-          </a:extLst>
-        </p:spPr>
-      </p:pic>
       <p:sp>
         <p:nvSpPr>
           <p:cNvPr id="7" name="ZoneTexte 6"/>
@@ -6241,7 +6146,7 @@
         <p:spPr>
           <a:xfrm>
             <a:off x="8855242" y="0"/>
-            <a:ext cx="2390273" cy="338554"/>
+            <a:ext cx="2703346" cy="338554"/>
           </a:xfrm>
           <a:prstGeom prst="rect">
             <a:avLst/>
@@ -6255,17 +6160,55 @@
           <a:lstStyle/>
           <a:p>
             <a:r>
+              <a:rPr lang="fr-BE" sz="1600" dirty="0" smtClean="0"/>
+              <a:t>Service </a:t>
+            </a:r>
+            <a:r>
               <a:rPr lang="fr-BE" sz="1600" dirty="0" err="1" smtClean="0"/>
-              <a:t>Overview</a:t>
+              <a:t>principals</a:t>
             </a:r>
             <a:r>
               <a:rPr lang="fr-BE" sz="1600" dirty="0" smtClean="0"/>
-              <a:t> of the ????</a:t>
+              <a:t> </a:t>
+            </a:r>
+            <a:r>
+              <a:rPr lang="fr-BE" sz="1600" dirty="0" err="1" smtClean="0"/>
+              <a:t>overview</a:t>
             </a:r>
             <a:endParaRPr lang="fr-BE" sz="1600" dirty="0"/>
           </a:p>
         </p:txBody>
       </p:sp>
+      <p:pic>
+        <p:nvPicPr>
+          <p:cNvPr id="2" name="Image 1"/>
+          <p:cNvPicPr>
+            <a:picLocks noChangeAspect="1"/>
+          </p:cNvPicPr>
+          <p:nvPr/>
+        </p:nvPicPr>
+        <p:blipFill>
+          <a:blip r:embed="rId2">
+            <a:extLst>
+              <a:ext uri="{28A0092B-C50C-407E-A947-70E740481C1C}">
+                <a14:useLocalDpi xmlns:a14="http://schemas.microsoft.com/office/drawing/2010/main" val="0"/>
+              </a:ext>
+            </a:extLst>
+          </a:blip>
+          <a:stretch>
+            <a:fillRect/>
+          </a:stretch>
+        </p:blipFill>
+        <p:spPr>
+          <a:xfrm>
+            <a:off x="1523569" y="338554"/>
+            <a:ext cx="9220631" cy="6189975"/>
+          </a:xfrm>
+          <a:prstGeom prst="rect">
+            <a:avLst/>
+          </a:prstGeom>
+        </p:spPr>
+      </p:pic>
     </p:spTree>
     <p:extLst>
       <p:ext uri="{BB962C8B-B14F-4D97-AF65-F5344CB8AC3E}">
@@ -6354,7 +6297,7 @@
         </p:nvSpPr>
         <p:spPr>
           <a:xfrm>
-            <a:off x="6962273" y="0"/>
+            <a:off x="6919410" y="0"/>
             <a:ext cx="6031831" cy="338554"/>
           </a:xfrm>
           <a:prstGeom prst="rect">
@@ -6369,16 +6312,12 @@
           <a:lstStyle/>
           <a:p>
             <a:r>
+              <a:rPr lang="fr-BE" sz="1600" dirty="0" smtClean="0"/>
+              <a:t>deploy-aks-k8s-cluster.sh script </a:t>
+            </a:r>
+            <a:r>
               <a:rPr lang="fr-BE" sz="1600" dirty="0" err="1" smtClean="0"/>
-              <a:t>Overview</a:t>
-            </a:r>
-            <a:r>
-              <a:rPr lang="fr-BE" sz="1600" dirty="0" smtClean="0"/>
-              <a:t> of the deloy-aks-k8s-cluster.sh script </a:t>
-            </a:r>
-            <a:r>
-              <a:rPr lang="fr-BE" sz="1600" dirty="0" err="1" smtClean="0"/>
-              <a:t>deployment</a:t>
+              <a:t>overview</a:t>
             </a:r>
             <a:endParaRPr lang="fr-BE" sz="1600" dirty="0"/>
           </a:p>
@@ -6434,7 +6373,7 @@
           <p:cNvPr id="11" name="Rectangle 10">
             <a:extLst>
               <a:ext uri="{FF2B5EF4-FFF2-40B4-BE49-F238E27FC236}">
-                <a16:creationId xmlns="" xmlns:a16="http://schemas.microsoft.com/office/drawing/2014/main" id="{8E37464E-1F18-46E8-9EAB-F4DDF41C0215}"/>
+                <a16:creationId xmlns:a16="http://schemas.microsoft.com/office/drawing/2014/main" xmlns="" id="{8E37464E-1F18-46E8-9EAB-F4DDF41C0215}"/>
               </a:ext>
             </a:extLst>
           </p:cNvPr>
@@ -6489,7 +6428,7 @@
           <p:cNvPr id="2" name="Picture 1" descr="A close up of a logo&#10;&#10;Description automatically generated">
             <a:extLst>
               <a:ext uri="{FF2B5EF4-FFF2-40B4-BE49-F238E27FC236}">
-                <a16:creationId xmlns="" xmlns:a16="http://schemas.microsoft.com/office/drawing/2014/main" id="{148A4CA5-114C-44CD-B175-E3231477B3CA}"/>
+                <a16:creationId xmlns:a16="http://schemas.microsoft.com/office/drawing/2014/main" xmlns="" id="{148A4CA5-114C-44CD-B175-E3231477B3CA}"/>
               </a:ext>
             </a:extLst>
           </p:cNvPr>
@@ -6525,7 +6464,7 @@
           <p:cNvPr id="9" name="TextBox 8">
             <a:extLst>
               <a:ext uri="{FF2B5EF4-FFF2-40B4-BE49-F238E27FC236}">
-                <a16:creationId xmlns="" xmlns:a16="http://schemas.microsoft.com/office/drawing/2014/main" id="{6C686B13-417B-4E43-BBDD-FB6063357088}"/>
+                <a16:creationId xmlns:a16="http://schemas.microsoft.com/office/drawing/2014/main" xmlns="" id="{6C686B13-417B-4E43-BBDD-FB6063357088}"/>
               </a:ext>
             </a:extLst>
           </p:cNvPr>
@@ -6575,7 +6514,7 @@
           <p:cNvPr id="10" name="TextBox 9">
             <a:extLst>
               <a:ext uri="{FF2B5EF4-FFF2-40B4-BE49-F238E27FC236}">
-                <a16:creationId xmlns="" xmlns:a16="http://schemas.microsoft.com/office/drawing/2014/main" id="{333451D4-49B8-4671-9C08-03ECD5B7BC3B}"/>
+                <a16:creationId xmlns:a16="http://schemas.microsoft.com/office/drawing/2014/main" xmlns="" id="{333451D4-49B8-4671-9C08-03ECD5B7BC3B}"/>
               </a:ext>
             </a:extLst>
           </p:cNvPr>
@@ -7252,6 +7191,15 @@
 </file>
 
 <file path=customXml/item2.xml><?xml version="1.0" encoding="utf-8"?>
+<?mso-contentType ?>
+<FormTemplates xmlns="http://schemas.microsoft.com/sharepoint/v3/contenttype/forms">
+  <Display>DocumentLibraryForm</Display>
+  <Edit>DocumentLibraryForm</Edit>
+  <New>DocumentLibraryForm</New>
+</FormTemplates>
+</file>
+
+<file path=customXml/item3.xml><?xml version="1.0" encoding="utf-8"?>
 <ct:contentTypeSchema xmlns:ct="http://schemas.microsoft.com/office/2006/metadata/contentType" xmlns:ma="http://schemas.microsoft.com/office/2006/metadata/properties/metaAttributes" ct:_="" ma:_="" ma:contentTypeName="Document" ma:contentTypeID="0x010100A38A89811ECC7341A43A19B6FB48F7E1" ma:contentTypeVersion="14" ma:contentTypeDescription="Create a new document." ma:contentTypeScope="" ma:versionID="53b12876a9dc171e6841db7c2f415704">
   <xsd:schema xmlns:xsd="http://www.w3.org/2001/XMLSchema" xmlns:xs="http://www.w3.org/2001/XMLSchema" xmlns:p="http://schemas.microsoft.com/office/2006/metadata/properties" xmlns:ns1="http://schemas.microsoft.com/sharepoint/v3" xmlns:ns2="bc487258-c1c0-43c6-bf00-584470d0bede" xmlns:ns3="9bf0e6da-88fd-4ecb-9c2a-ff466c48006f" targetNamespace="http://schemas.microsoft.com/office/2006/metadata/properties" ma:root="true" ma:fieldsID="bdea3c0a5e56144fb6d8b3d4b4a1aeab" ns1:_="" ns2:_="" ns3:_="">
     <xsd:import namespace="http://schemas.microsoft.com/sharepoint/v3"/>
@@ -7485,15 +7433,6 @@
 </ct:contentTypeSchema>
 </file>
 
-<file path=customXml/item3.xml><?xml version="1.0" encoding="utf-8"?>
-<?mso-contentType ?>
-<FormTemplates xmlns="http://schemas.microsoft.com/sharepoint/v3/contenttype/forms">
-  <Display>DocumentLibraryForm</Display>
-  <Edit>DocumentLibraryForm</Edit>
-  <New>DocumentLibraryForm</New>
-</FormTemplates>
-</file>
-
 <file path=customXml/itemProps1.xml><?xml version="1.0" encoding="utf-8"?>
 <ds:datastoreItem xmlns:ds="http://schemas.openxmlformats.org/officeDocument/2006/customXml" ds:itemID="{B760C080-9903-4ED1-A019-F8AF78E3F920}">
   <ds:schemaRefs>
@@ -7513,6 +7452,14 @@
 </file>
 
 <file path=customXml/itemProps2.xml><?xml version="1.0" encoding="utf-8"?>
+<ds:datastoreItem xmlns:ds="http://schemas.openxmlformats.org/officeDocument/2006/customXml" ds:itemID="{49844BAE-3143-4DDE-A131-826557FF8F35}">
+  <ds:schemaRefs>
+    <ds:schemaRef ds:uri="http://schemas.microsoft.com/sharepoint/v3/contenttype/forms"/>
+  </ds:schemaRefs>
+</ds:datastoreItem>
+</file>
+
+<file path=customXml/itemProps3.xml><?xml version="1.0" encoding="utf-8"?>
 <ds:datastoreItem xmlns:ds="http://schemas.openxmlformats.org/officeDocument/2006/customXml" ds:itemID="{6A53AB11-3D5E-4B2C-92FF-7CE4F252F705}">
   <ds:schemaRefs>
     <ds:schemaRef ds:uri="http://schemas.microsoft.com/office/2006/metadata/contentType"/>
@@ -7530,12 +7477,4 @@
     <ds:schemaRef ds:uri="http://schemas.microsoft.com/internal/obd"/>
   </ds:schemaRefs>
 </ds:datastoreItem>
-</file>
-
-<file path=customXml/itemProps3.xml><?xml version="1.0" encoding="utf-8"?>
-<ds:datastoreItem xmlns:ds="http://schemas.openxmlformats.org/officeDocument/2006/customXml" ds:itemID="{49844BAE-3143-4DDE-A131-826557FF8F35}">
-  <ds:schemaRefs>
-    <ds:schemaRef ds:uri="http://schemas.microsoft.com/sharepoint/v3/contenttype/forms"/>
-  </ds:schemaRefs>
-</ds:datastoreItem>
 </file>
</xml_diff>